<commit_message>
Prezentacja "Less - sposób na uproszczenie pracy z CSS" - poprawki
</commit_message>
<xml_diff>
--- a/Less - sposób na uproszczenie pracy z CSS.pptx
+++ b/Less - sposób na uproszczenie pracy z CSS.pptx
@@ -232,7 +232,7 @@
           <a:p>
             <a:fld id="{2327238E-7806-4DAB-9F53-A72A3BB5B51C}" type="datetimeFigureOut">
               <a:rPr lang="pl-PL" smtClean="0"/>
-              <a:t>06.11.2015</a:t>
+              <a:t>15.01.2016</a:t>
             </a:fld>
             <a:endParaRPr lang="pl-PL"/>
           </a:p>
@@ -1870,7 +1870,7 @@
           <a:p>
             <a:fld id="{D4F9F497-47CE-43C6-ABB8-882C3E78572A}" type="datetimeFigureOut">
               <a:rPr lang="pl-PL" smtClean="0"/>
-              <a:t>06.11.2015</a:t>
+              <a:t>15.01.2016</a:t>
             </a:fld>
             <a:endParaRPr lang="pl-PL"/>
           </a:p>
@@ -2121,7 +2121,7 @@
           <a:p>
             <a:fld id="{D4F9F497-47CE-43C6-ABB8-882C3E78572A}" type="datetimeFigureOut">
               <a:rPr lang="pl-PL" smtClean="0"/>
-              <a:t>06.11.2015</a:t>
+              <a:t>15.01.2016</a:t>
             </a:fld>
             <a:endParaRPr lang="pl-PL"/>
           </a:p>
@@ -2435,7 +2435,7 @@
           <a:p>
             <a:fld id="{D4F9F497-47CE-43C6-ABB8-882C3E78572A}" type="datetimeFigureOut">
               <a:rPr lang="pl-PL" smtClean="0"/>
-              <a:t>06.11.2015</a:t>
+              <a:t>15.01.2016</a:t>
             </a:fld>
             <a:endParaRPr lang="pl-PL"/>
           </a:p>
@@ -2768,7 +2768,7 @@
           <a:p>
             <a:fld id="{D4F9F497-47CE-43C6-ABB8-882C3E78572A}" type="datetimeFigureOut">
               <a:rPr lang="pl-PL" smtClean="0"/>
-              <a:t>06.11.2015</a:t>
+              <a:t>15.01.2016</a:t>
             </a:fld>
             <a:endParaRPr lang="pl-PL"/>
           </a:p>
@@ -3082,7 +3082,7 @@
           <a:p>
             <a:fld id="{D4F9F497-47CE-43C6-ABB8-882C3E78572A}" type="datetimeFigureOut">
               <a:rPr lang="pl-PL" smtClean="0"/>
-              <a:t>06.11.2015</a:t>
+              <a:t>15.01.2016</a:t>
             </a:fld>
             <a:endParaRPr lang="pl-PL"/>
           </a:p>
@@ -3475,7 +3475,7 @@
           <a:p>
             <a:fld id="{D4F9F497-47CE-43C6-ABB8-882C3E78572A}" type="datetimeFigureOut">
               <a:rPr lang="pl-PL" smtClean="0"/>
-              <a:t>06.11.2015</a:t>
+              <a:t>15.01.2016</a:t>
             </a:fld>
             <a:endParaRPr lang="pl-PL"/>
           </a:p>
@@ -3645,7 +3645,7 @@
           <a:p>
             <a:fld id="{D4F9F497-47CE-43C6-ABB8-882C3E78572A}" type="datetimeFigureOut">
               <a:rPr lang="pl-PL" smtClean="0"/>
-              <a:t>06.11.2015</a:t>
+              <a:t>15.01.2016</a:t>
             </a:fld>
             <a:endParaRPr lang="pl-PL"/>
           </a:p>
@@ -3825,7 +3825,7 @@
           <a:p>
             <a:fld id="{D4F9F497-47CE-43C6-ABB8-882C3E78572A}" type="datetimeFigureOut">
               <a:rPr lang="pl-PL" smtClean="0"/>
-              <a:t>06.11.2015</a:t>
+              <a:t>15.01.2016</a:t>
             </a:fld>
             <a:endParaRPr lang="pl-PL"/>
           </a:p>
@@ -3995,7 +3995,7 @@
           <a:p>
             <a:fld id="{D4F9F497-47CE-43C6-ABB8-882C3E78572A}" type="datetimeFigureOut">
               <a:rPr lang="pl-PL" smtClean="0"/>
-              <a:t>06.11.2015</a:t>
+              <a:t>15.01.2016</a:t>
             </a:fld>
             <a:endParaRPr lang="pl-PL"/>
           </a:p>
@@ -4242,7 +4242,7 @@
           <a:p>
             <a:fld id="{D4F9F497-47CE-43C6-ABB8-882C3E78572A}" type="datetimeFigureOut">
               <a:rPr lang="pl-PL" smtClean="0"/>
-              <a:t>06.11.2015</a:t>
+              <a:t>15.01.2016</a:t>
             </a:fld>
             <a:endParaRPr lang="pl-PL"/>
           </a:p>
@@ -4474,7 +4474,7 @@
           <a:p>
             <a:fld id="{D4F9F497-47CE-43C6-ABB8-882C3E78572A}" type="datetimeFigureOut">
               <a:rPr lang="pl-PL" smtClean="0"/>
-              <a:t>06.11.2015</a:t>
+              <a:t>15.01.2016</a:t>
             </a:fld>
             <a:endParaRPr lang="pl-PL"/>
           </a:p>
@@ -4848,7 +4848,7 @@
           <a:p>
             <a:fld id="{D4F9F497-47CE-43C6-ABB8-882C3E78572A}" type="datetimeFigureOut">
               <a:rPr lang="pl-PL" smtClean="0"/>
-              <a:t>06.11.2015</a:t>
+              <a:t>15.01.2016</a:t>
             </a:fld>
             <a:endParaRPr lang="pl-PL"/>
           </a:p>
@@ -4971,7 +4971,7 @@
           <a:p>
             <a:fld id="{D4F9F497-47CE-43C6-ABB8-882C3E78572A}" type="datetimeFigureOut">
               <a:rPr lang="pl-PL" smtClean="0"/>
-              <a:t>06.11.2015</a:t>
+              <a:t>15.01.2016</a:t>
             </a:fld>
             <a:endParaRPr lang="pl-PL"/>
           </a:p>
@@ -5066,7 +5066,7 @@
           <a:p>
             <a:fld id="{D4F9F497-47CE-43C6-ABB8-882C3E78572A}" type="datetimeFigureOut">
               <a:rPr lang="pl-PL" smtClean="0"/>
-              <a:t>06.11.2015</a:t>
+              <a:t>15.01.2016</a:t>
             </a:fld>
             <a:endParaRPr lang="pl-PL"/>
           </a:p>
@@ -5321,7 +5321,7 @@
           <a:p>
             <a:fld id="{D4F9F497-47CE-43C6-ABB8-882C3E78572A}" type="datetimeFigureOut">
               <a:rPr lang="pl-PL" smtClean="0"/>
-              <a:t>06.11.2015</a:t>
+              <a:t>15.01.2016</a:t>
             </a:fld>
             <a:endParaRPr lang="pl-PL"/>
           </a:p>
@@ -5626,7 +5626,7 @@
           <a:p>
             <a:fld id="{D4F9F497-47CE-43C6-ABB8-882C3E78572A}" type="datetimeFigureOut">
               <a:rPr lang="pl-PL" smtClean="0"/>
-              <a:t>06.11.2015</a:t>
+              <a:t>15.01.2016</a:t>
             </a:fld>
             <a:endParaRPr lang="pl-PL"/>
           </a:p>
@@ -6328,7 +6328,7 @@
           <a:p>
             <a:fld id="{D4F9F497-47CE-43C6-ABB8-882C3E78572A}" type="datetimeFigureOut">
               <a:rPr lang="pl-PL" smtClean="0"/>
-              <a:t>06.11.2015</a:t>
+              <a:t>15.01.2016</a:t>
             </a:fld>
             <a:endParaRPr lang="pl-PL"/>
           </a:p>
@@ -6917,11 +6917,7 @@
           <a:p>
             <a:r>
               <a:rPr lang="pl-PL" dirty="0" smtClean="0"/>
-              <a:t>Grzegorz </a:t>
-            </a:r>
-            <a:r>
-              <a:rPr lang="pl-PL" dirty="0" smtClean="0"/>
-              <a:t>Wodniczak</a:t>
+              <a:t>Grzegorz Wodniczak</a:t>
             </a:r>
             <a:endParaRPr lang="pl-PL" dirty="0"/>
           </a:p>
@@ -12439,8 +12435,13 @@
           <a:p>
             <a:r>
               <a:rPr lang="pl-PL" dirty="0" smtClean="0"/>
-              <a:t>Funkcje umożliwiające wykonywanie operacji matematycznych</a:t>
-            </a:r>
+              <a:t>Funkcje umożliwiające wykonywanie operacji </a:t>
+            </a:r>
+            <a:r>
+              <a:rPr lang="pl-PL" dirty="0" smtClean="0"/>
+              <a:t>matematycznych:</a:t>
+            </a:r>
+            <a:endParaRPr lang="pl-PL" dirty="0" smtClean="0"/>
           </a:p>
           <a:p>
             <a:pPr marL="457200" lvl="1" indent="0">
@@ -13306,8 +13307,13 @@
           <a:p>
             <a:r>
               <a:rPr lang="pl-PL" dirty="0" smtClean="0"/>
-              <a:t>Funkcje umożliwiające wykonywanie operacji na kolorach</a:t>
-            </a:r>
+              <a:t>Funkcje umożliwiające wykonywanie operacji na </a:t>
+            </a:r>
+            <a:r>
+              <a:rPr lang="pl-PL" dirty="0" smtClean="0"/>
+              <a:t>kolorach:</a:t>
+            </a:r>
+            <a:endParaRPr lang="pl-PL" dirty="0" smtClean="0"/>
           </a:p>
           <a:p>
             <a:pPr marL="457200" lvl="1" indent="0">
@@ -13472,7 +13478,7 @@
             </a:r>
             <a:r>
               <a:rPr lang="pl-PL" dirty="0" smtClean="0"/>
-              <a:t>typach</a:t>
+              <a:t>typach:</a:t>
             </a:r>
             <a:endParaRPr lang="pl-PL" dirty="0"/>
           </a:p>
@@ -13647,7 +13653,7 @@
               <a:rPr lang="pl-PL" dirty="0" smtClean="0">
                 <a:cs typeface="Courier New" panose="02070309020205020404" pitchFamily="49" charset="0"/>
               </a:rPr>
-              <a:t>funkcji</a:t>
+              <a:t>funkcji:</a:t>
             </a:r>
             <a:endParaRPr lang="pl-PL" dirty="0">
               <a:cs typeface="Courier New" panose="02070309020205020404" pitchFamily="49" charset="0"/>
@@ -14231,6 +14237,10 @@
               <a:rPr lang="pl-PL" i="1" dirty="0" err="1" smtClean="0"/>
               <a:t>Test.less</a:t>
             </a:r>
+            <a:r>
+              <a:rPr lang="pl-PL" dirty="0" smtClean="0"/>
+              <a:t>:</a:t>
+            </a:r>
             <a:endParaRPr lang="pl-PL" dirty="0" smtClean="0"/>
           </a:p>
           <a:p>
@@ -14283,6 +14293,11 @@
               <a:rPr lang="pl-PL" i="1" dirty="0" smtClean="0"/>
               <a:t>Test.css</a:t>
             </a:r>
+            <a:r>
+              <a:rPr lang="pl-PL" dirty="0" smtClean="0"/>
+              <a:t>:</a:t>
+            </a:r>
+            <a:endParaRPr lang="pl-PL" i="1" dirty="0" smtClean="0"/>
           </a:p>
           <a:p>
             <a:pPr marL="457200" lvl="1" indent="0">
@@ -14356,15 +14371,16 @@
               <a:t> (z uwzględnieniem procesu </a:t>
             </a:r>
             <a:r>
-              <a:rPr lang="pl-PL" dirty="0" smtClean="0">
+              <a:rPr lang="pl-PL" dirty="0" err="1" smtClean="0">
                 <a:hlinkClick r:id="rId2"/>
               </a:rPr>
               <a:t>minifikacji</a:t>
             </a:r>
             <a:r>
               <a:rPr lang="pl-PL" dirty="0" smtClean="0"/>
-              <a:t>)</a:t>
-            </a:r>
+              <a:t>):</a:t>
+            </a:r>
+            <a:endParaRPr lang="pl-PL" dirty="0" smtClean="0"/>
           </a:p>
           <a:p>
             <a:pPr marL="457200" lvl="1" indent="0">
@@ -14426,8 +14442,17 @@
               <a:rPr lang="pl-PL" dirty="0" smtClean="0">
                 <a:cs typeface="Courier New" panose="02070309020205020404" pitchFamily="49" charset="0"/>
               </a:rPr>
-              <a:t>Pełna lista dostępnych poleceń</a:t>
-            </a:r>
+              <a:t>Pełna lista dostępnych </a:t>
+            </a:r>
+            <a:r>
+              <a:rPr lang="pl-PL" dirty="0" smtClean="0">
+                <a:cs typeface="Courier New" panose="02070309020205020404" pitchFamily="49" charset="0"/>
+              </a:rPr>
+              <a:t>poleceń:</a:t>
+            </a:r>
+            <a:endParaRPr lang="pl-PL" dirty="0" smtClean="0">
+              <a:cs typeface="Courier New" panose="02070309020205020404" pitchFamily="49" charset="0"/>
+            </a:endParaRPr>
           </a:p>
           <a:p>
             <a:pPr marL="457200" lvl="1" indent="0">
@@ -17352,8 +17377,13 @@
             </a:r>
             <a:r>
               <a:rPr lang="pl-PL" dirty="0" smtClean="0"/>
-              <a:t> dokumentacja</a:t>
-            </a:r>
+              <a:t> </a:t>
+            </a:r>
+            <a:r>
+              <a:rPr lang="pl-PL" dirty="0" smtClean="0"/>
+              <a:t>dokumentacja:</a:t>
+            </a:r>
+            <a:endParaRPr lang="pl-PL" dirty="0" smtClean="0"/>
           </a:p>
           <a:p>
             <a:pPr marL="457200" lvl="1" indent="0">
@@ -17382,8 +17412,13 @@
           <a:p>
             <a:r>
               <a:rPr lang="pl-PL" dirty="0" smtClean="0"/>
-              <a:t>Repozytorium kodu</a:t>
-            </a:r>
+              <a:t>Repozytorium </a:t>
+            </a:r>
+            <a:r>
+              <a:rPr lang="pl-PL" dirty="0" smtClean="0"/>
+              <a:t>kodu:</a:t>
+            </a:r>
+            <a:endParaRPr lang="pl-PL" dirty="0" smtClean="0"/>
           </a:p>
           <a:p>
             <a:pPr marL="457200" lvl="1" indent="0">

</xml_diff>